<commit_message>
spider, queen and beetle in complete
</commit_message>
<xml_diff>
--- a/hive.pptx
+++ b/hive.pptx
@@ -270,7 +270,7 @@
           <a:p>
             <a:fld id="{09D3105B-3BB3-4DF0-B896-E1E0A5859241}" type="datetimeFigureOut">
               <a:rPr lang="en-US" smtClean="0"/>
-              <a:t>4/18/2022</a:t>
+              <a:t>4/20/2022</a:t>
             </a:fld>
             <a:endParaRPr lang="en-US"/>
           </a:p>
@@ -468,7 +468,7 @@
           <a:p>
             <a:fld id="{09D3105B-3BB3-4DF0-B896-E1E0A5859241}" type="datetimeFigureOut">
               <a:rPr lang="en-US" smtClean="0"/>
-              <a:t>4/18/2022</a:t>
+              <a:t>4/20/2022</a:t>
             </a:fld>
             <a:endParaRPr lang="en-US"/>
           </a:p>
@@ -676,7 +676,7 @@
           <a:p>
             <a:fld id="{09D3105B-3BB3-4DF0-B896-E1E0A5859241}" type="datetimeFigureOut">
               <a:rPr lang="en-US" smtClean="0"/>
-              <a:t>4/18/2022</a:t>
+              <a:t>4/20/2022</a:t>
             </a:fld>
             <a:endParaRPr lang="en-US"/>
           </a:p>
@@ -874,7 +874,7 @@
           <a:p>
             <a:fld id="{09D3105B-3BB3-4DF0-B896-E1E0A5859241}" type="datetimeFigureOut">
               <a:rPr lang="en-US" smtClean="0"/>
-              <a:t>4/18/2022</a:t>
+              <a:t>4/20/2022</a:t>
             </a:fld>
             <a:endParaRPr lang="en-US"/>
           </a:p>
@@ -1149,7 +1149,7 @@
           <a:p>
             <a:fld id="{09D3105B-3BB3-4DF0-B896-E1E0A5859241}" type="datetimeFigureOut">
               <a:rPr lang="en-US" smtClean="0"/>
-              <a:t>4/18/2022</a:t>
+              <a:t>4/20/2022</a:t>
             </a:fld>
             <a:endParaRPr lang="en-US"/>
           </a:p>
@@ -1414,7 +1414,7 @@
           <a:p>
             <a:fld id="{09D3105B-3BB3-4DF0-B896-E1E0A5859241}" type="datetimeFigureOut">
               <a:rPr lang="en-US" smtClean="0"/>
-              <a:t>4/18/2022</a:t>
+              <a:t>4/20/2022</a:t>
             </a:fld>
             <a:endParaRPr lang="en-US"/>
           </a:p>
@@ -1826,7 +1826,7 @@
           <a:p>
             <a:fld id="{09D3105B-3BB3-4DF0-B896-E1E0A5859241}" type="datetimeFigureOut">
               <a:rPr lang="en-US" smtClean="0"/>
-              <a:t>4/18/2022</a:t>
+              <a:t>4/20/2022</a:t>
             </a:fld>
             <a:endParaRPr lang="en-US"/>
           </a:p>
@@ -1967,7 +1967,7 @@
           <a:p>
             <a:fld id="{09D3105B-3BB3-4DF0-B896-E1E0A5859241}" type="datetimeFigureOut">
               <a:rPr lang="en-US" smtClean="0"/>
-              <a:t>4/18/2022</a:t>
+              <a:t>4/20/2022</a:t>
             </a:fld>
             <a:endParaRPr lang="en-US"/>
           </a:p>
@@ -2080,7 +2080,7 @@
           <a:p>
             <a:fld id="{09D3105B-3BB3-4DF0-B896-E1E0A5859241}" type="datetimeFigureOut">
               <a:rPr lang="en-US" smtClean="0"/>
-              <a:t>4/18/2022</a:t>
+              <a:t>4/20/2022</a:t>
             </a:fld>
             <a:endParaRPr lang="en-US"/>
           </a:p>
@@ -2391,7 +2391,7 @@
           <a:p>
             <a:fld id="{09D3105B-3BB3-4DF0-B896-E1E0A5859241}" type="datetimeFigureOut">
               <a:rPr lang="en-US" smtClean="0"/>
-              <a:t>4/18/2022</a:t>
+              <a:t>4/20/2022</a:t>
             </a:fld>
             <a:endParaRPr lang="en-US"/>
           </a:p>
@@ -2679,7 +2679,7 @@
           <a:p>
             <a:fld id="{09D3105B-3BB3-4DF0-B896-E1E0A5859241}" type="datetimeFigureOut">
               <a:rPr lang="en-US" smtClean="0"/>
-              <a:t>4/18/2022</a:t>
+              <a:t>4/20/2022</a:t>
             </a:fld>
             <a:endParaRPr lang="en-US"/>
           </a:p>
@@ -2920,7 +2920,7 @@
           <a:p>
             <a:fld id="{09D3105B-3BB3-4DF0-B896-E1E0A5859241}" type="datetimeFigureOut">
               <a:rPr lang="en-US" smtClean="0"/>
-              <a:t>4/18/2022</a:t>
+              <a:t>4/20/2022</a:t>
             </a:fld>
             <a:endParaRPr lang="en-US"/>
           </a:p>
@@ -10579,7 +10579,7 @@
         </p:nvGrpSpPr>
         <p:grpSpPr>
           <a:xfrm>
-            <a:off x="778881" y="1128512"/>
+            <a:off x="778878" y="0"/>
             <a:ext cx="10634238" cy="4600976"/>
             <a:chOff x="1286151" y="825756"/>
             <a:chExt cx="10634238" cy="4600976"/>
@@ -11068,26 +11068,30 @@
           </p:spPr>
           <p:style>
             <a:lnRef idx="2">
-              <a:schemeClr val="accent4">
-                <a:shade val="50000"/>
-              </a:schemeClr>
-            </a:lnRef>
-            <a:fillRef idx="1">
-              <a:schemeClr val="accent4"/>
-            </a:fillRef>
-            <a:effectRef idx="0">
-              <a:schemeClr val="accent4"/>
-            </a:effectRef>
-            <a:fontRef idx="minor">
-              <a:schemeClr val="lt1"/>
-            </a:fontRef>
-          </p:style>
-          <p:txBody>
-            <a:bodyPr rtlCol="0" anchor="ctr"/>
-            <a:lstStyle/>
-            <a:p>
-              <a:pPr algn="ctr"/>
-              <a:endParaRPr lang="en-US" dirty="0"/>
+              <a:schemeClr val="accent2">
+                <a:shade val="50000"/>
+              </a:schemeClr>
+            </a:lnRef>
+            <a:fillRef idx="1">
+              <a:schemeClr val="accent2"/>
+            </a:fillRef>
+            <a:effectRef idx="0">
+              <a:schemeClr val="accent2"/>
+            </a:effectRef>
+            <a:fontRef idx="minor">
+              <a:schemeClr val="lt1"/>
+            </a:fontRef>
+          </p:style>
+          <p:txBody>
+            <a:bodyPr rtlCol="0" anchor="ctr"/>
+            <a:lstStyle/>
+            <a:p>
+              <a:pPr algn="ctr"/>
+              <a:endParaRPr lang="en-US" dirty="0">
+                <a:solidFill>
+                  <a:srgbClr val="FF0000"/>
+                </a:solidFill>
+              </a:endParaRPr>
             </a:p>
           </p:txBody>
         </p:sp>
@@ -11507,10 +11511,56 @@
         </p:sp>
         <p:sp>
           <p:nvSpPr>
-            <p:cNvPr id="25" name="TextBox 24">
-              <a:extLst>
-                <a:ext uri="{FF2B5EF4-FFF2-40B4-BE49-F238E27FC236}">
-                  <a16:creationId xmlns:a16="http://schemas.microsoft.com/office/drawing/2014/main" id="{BE8BAAD4-F1A1-466A-B060-6F2D6B2B5898}"/>
+            <p:cNvPr id="27" name="Hexagon 26">
+              <a:extLst>
+                <a:ext uri="{FF2B5EF4-FFF2-40B4-BE49-F238E27FC236}">
+                  <a16:creationId xmlns:a16="http://schemas.microsoft.com/office/drawing/2014/main" id="{75656F04-88B0-4E1F-BDD5-F5E1CC053862}"/>
+                </a:ext>
+              </a:extLst>
+            </p:cNvPr>
+            <p:cNvSpPr/>
+            <p:nvPr/>
+          </p:nvSpPr>
+          <p:spPr>
+            <a:xfrm rot="16200000">
+              <a:off x="7103629" y="929189"/>
+              <a:ext cx="1371600" cy="1182414"/>
+            </a:xfrm>
+            <a:prstGeom prst="hexagon">
+              <a:avLst/>
+            </a:prstGeom>
+          </p:spPr>
+          <p:style>
+            <a:lnRef idx="2">
+              <a:schemeClr val="accent4">
+                <a:shade val="50000"/>
+              </a:schemeClr>
+            </a:lnRef>
+            <a:fillRef idx="1">
+              <a:schemeClr val="accent4"/>
+            </a:fillRef>
+            <a:effectRef idx="0">
+              <a:schemeClr val="accent4"/>
+            </a:effectRef>
+            <a:fontRef idx="minor">
+              <a:schemeClr val="lt1"/>
+            </a:fontRef>
+          </p:style>
+          <p:txBody>
+            <a:bodyPr rtlCol="0" anchor="ctr"/>
+            <a:lstStyle/>
+            <a:p>
+              <a:pPr algn="ctr"/>
+              <a:endParaRPr lang="en-US" dirty="0"/>
+            </a:p>
+          </p:txBody>
+        </p:sp>
+        <p:sp>
+          <p:nvSpPr>
+            <p:cNvPr id="29" name="TextBox 28">
+              <a:extLst>
+                <a:ext uri="{FF2B5EF4-FFF2-40B4-BE49-F238E27FC236}">
+                  <a16:creationId xmlns:a16="http://schemas.microsoft.com/office/drawing/2014/main" id="{2749FBE5-DD45-4C5F-9020-3F9965192E65}"/>
                 </a:ext>
               </a:extLst>
             </p:cNvPr>
@@ -11519,7 +11569,7 @@
           </p:nvSpPr>
           <p:spPr>
             <a:xfrm>
-              <a:off x="4910544" y="1326889"/>
+              <a:off x="6099521" y="3496978"/>
               <a:ext cx="1026234" cy="369332"/>
             </a:xfrm>
             <a:prstGeom prst="rect">
@@ -11536,167 +11586,13 @@
               <a:pPr algn="ctr"/>
               <a:r>
                 <a:rPr lang="en-US" dirty="0"/>
-                <a:t>wA1</a:t>
+                <a:t>spider</a:t>
               </a:r>
             </a:p>
           </p:txBody>
         </p:sp>
         <p:sp>
           <p:nvSpPr>
-            <p:cNvPr id="26" name="TextBox 25">
-              <a:extLst>
-                <a:ext uri="{FF2B5EF4-FFF2-40B4-BE49-F238E27FC236}">
-                  <a16:creationId xmlns:a16="http://schemas.microsoft.com/office/drawing/2014/main" id="{B7D25F5D-6BC4-4CB2-B046-056CC47BE337}"/>
-                </a:ext>
-              </a:extLst>
-            </p:cNvPr>
-            <p:cNvSpPr txBox="1"/>
-            <p:nvPr/>
-          </p:nvSpPr>
-          <p:spPr>
-            <a:xfrm>
-              <a:off x="6092958" y="1326889"/>
-              <a:ext cx="1026234" cy="369332"/>
-            </a:xfrm>
-            <a:prstGeom prst="rect">
-              <a:avLst/>
-            </a:prstGeom>
-            <a:noFill/>
-          </p:spPr>
-          <p:txBody>
-            <a:bodyPr wrap="square" rtlCol="0">
-              <a:spAutoFit/>
-            </a:bodyPr>
-            <a:lstStyle/>
-            <a:p>
-              <a:pPr algn="ctr"/>
-              <a:r>
-                <a:rPr lang="en-US" dirty="0"/>
-                <a:t>bA1</a:t>
-              </a:r>
-            </a:p>
-          </p:txBody>
-        </p:sp>
-        <p:sp>
-          <p:nvSpPr>
-            <p:cNvPr id="27" name="Hexagon 26">
-              <a:extLst>
-                <a:ext uri="{FF2B5EF4-FFF2-40B4-BE49-F238E27FC236}">
-                  <a16:creationId xmlns:a16="http://schemas.microsoft.com/office/drawing/2014/main" id="{75656F04-88B0-4E1F-BDD5-F5E1CC053862}"/>
-                </a:ext>
-              </a:extLst>
-            </p:cNvPr>
-            <p:cNvSpPr/>
-            <p:nvPr/>
-          </p:nvSpPr>
-          <p:spPr>
-            <a:xfrm rot="16200000">
-              <a:off x="7103629" y="929189"/>
-              <a:ext cx="1371600" cy="1182414"/>
-            </a:xfrm>
-            <a:prstGeom prst="hexagon">
-              <a:avLst/>
-            </a:prstGeom>
-          </p:spPr>
-          <p:style>
-            <a:lnRef idx="2">
-              <a:schemeClr val="accent4">
-                <a:shade val="50000"/>
-              </a:schemeClr>
-            </a:lnRef>
-            <a:fillRef idx="1">
-              <a:schemeClr val="accent4"/>
-            </a:fillRef>
-            <a:effectRef idx="0">
-              <a:schemeClr val="accent4"/>
-            </a:effectRef>
-            <a:fontRef idx="minor">
-              <a:schemeClr val="lt1"/>
-            </a:fontRef>
-          </p:style>
-          <p:txBody>
-            <a:bodyPr rtlCol="0" anchor="ctr"/>
-            <a:lstStyle/>
-            <a:p>
-              <a:pPr algn="ctr"/>
-              <a:endParaRPr lang="en-US" dirty="0"/>
-            </a:p>
-          </p:txBody>
-        </p:sp>
-        <p:sp>
-          <p:nvSpPr>
-            <p:cNvPr id="28" name="TextBox 27">
-              <a:extLst>
-                <a:ext uri="{FF2B5EF4-FFF2-40B4-BE49-F238E27FC236}">
-                  <a16:creationId xmlns:a16="http://schemas.microsoft.com/office/drawing/2014/main" id="{2F9C8888-138B-488D-A59D-8EAA6F65E5F3}"/>
-                </a:ext>
-              </a:extLst>
-            </p:cNvPr>
-            <p:cNvSpPr txBox="1"/>
-            <p:nvPr/>
-          </p:nvSpPr>
-          <p:spPr>
-            <a:xfrm>
-              <a:off x="1955449" y="2409240"/>
-              <a:ext cx="1026234" cy="369332"/>
-            </a:xfrm>
-            <a:prstGeom prst="rect">
-              <a:avLst/>
-            </a:prstGeom>
-            <a:noFill/>
-          </p:spPr>
-          <p:txBody>
-            <a:bodyPr wrap="square" rtlCol="0">
-              <a:spAutoFit/>
-            </a:bodyPr>
-            <a:lstStyle/>
-            <a:p>
-              <a:pPr algn="ctr"/>
-              <a:r>
-                <a:rPr lang="en-US" dirty="0"/>
-                <a:t>bB1</a:t>
-              </a:r>
-            </a:p>
-          </p:txBody>
-        </p:sp>
-        <p:sp>
-          <p:nvSpPr>
-            <p:cNvPr id="29" name="TextBox 28">
-              <a:extLst>
-                <a:ext uri="{FF2B5EF4-FFF2-40B4-BE49-F238E27FC236}">
-                  <a16:creationId xmlns:a16="http://schemas.microsoft.com/office/drawing/2014/main" id="{2749FBE5-DD45-4C5F-9020-3F9965192E65}"/>
-                </a:ext>
-              </a:extLst>
-            </p:cNvPr>
-            <p:cNvSpPr txBox="1"/>
-            <p:nvPr/>
-          </p:nvSpPr>
-          <p:spPr>
-            <a:xfrm>
-              <a:off x="4320277" y="2403210"/>
-              <a:ext cx="1026234" cy="369332"/>
-            </a:xfrm>
-            <a:prstGeom prst="rect">
-              <a:avLst/>
-            </a:prstGeom>
-            <a:noFill/>
-          </p:spPr>
-          <p:txBody>
-            <a:bodyPr wrap="square" rtlCol="0">
-              <a:spAutoFit/>
-            </a:bodyPr>
-            <a:lstStyle/>
-            <a:p>
-              <a:pPr algn="ctr"/>
-              <a:r>
-                <a:rPr lang="en-US" dirty="0"/>
-                <a:t>wA2</a:t>
-              </a:r>
-            </a:p>
-          </p:txBody>
-        </p:sp>
-        <p:sp>
-          <p:nvSpPr>
             <p:cNvPr id="31" name="Hexagon 30">
               <a:extLst>
                 <a:ext uri="{FF2B5EF4-FFF2-40B4-BE49-F238E27FC236}">
@@ -11810,15 +11706,15 @@
           </p:spPr>
           <p:style>
             <a:lnRef idx="2">
-              <a:schemeClr val="accent4">
-                <a:shade val="50000"/>
-              </a:schemeClr>
-            </a:lnRef>
-            <a:fillRef idx="1">
-              <a:schemeClr val="accent4"/>
-            </a:fillRef>
-            <a:effectRef idx="0">
-              <a:schemeClr val="accent4"/>
+              <a:schemeClr val="accent2">
+                <a:shade val="50000"/>
+              </a:schemeClr>
+            </a:lnRef>
+            <a:fillRef idx="1">
+              <a:schemeClr val="accent2"/>
+            </a:fillRef>
+            <a:effectRef idx="0">
+              <a:schemeClr val="accent2"/>
             </a:effectRef>
             <a:fontRef idx="minor">
               <a:schemeClr val="lt1"/>
@@ -12293,7 +12189,1111 @@
             </a:p>
           </p:txBody>
         </p:sp>
+        <p:sp>
+          <p:nvSpPr>
+            <p:cNvPr id="55" name="Hexagon 54">
+              <a:extLst>
+                <a:ext uri="{FF2B5EF4-FFF2-40B4-BE49-F238E27FC236}">
+                  <a16:creationId xmlns:a16="http://schemas.microsoft.com/office/drawing/2014/main" id="{3A1E1F75-52BF-4D16-80F6-5C0C92AC604C}"/>
+                </a:ext>
+              </a:extLst>
+            </p:cNvPr>
+            <p:cNvSpPr/>
+            <p:nvPr/>
+          </p:nvSpPr>
+          <p:spPr>
+            <a:xfrm rot="16200000">
+              <a:off x="1786511" y="4149725"/>
+              <a:ext cx="1371600" cy="1182414"/>
+            </a:xfrm>
+            <a:prstGeom prst="hexagon">
+              <a:avLst/>
+            </a:prstGeom>
+          </p:spPr>
+          <p:style>
+            <a:lnRef idx="2">
+              <a:schemeClr val="accent4">
+                <a:shade val="50000"/>
+              </a:schemeClr>
+            </a:lnRef>
+            <a:fillRef idx="1">
+              <a:schemeClr val="accent4"/>
+            </a:fillRef>
+            <a:effectRef idx="0">
+              <a:schemeClr val="accent4"/>
+            </a:effectRef>
+            <a:fontRef idx="minor">
+              <a:schemeClr val="lt1"/>
+            </a:fontRef>
+          </p:style>
+          <p:txBody>
+            <a:bodyPr rtlCol="0" anchor="ctr"/>
+            <a:lstStyle/>
+            <a:p>
+              <a:pPr algn="ctr"/>
+              <a:endParaRPr lang="en-US" dirty="0"/>
+            </a:p>
+          </p:txBody>
+        </p:sp>
+        <p:sp>
+          <p:nvSpPr>
+            <p:cNvPr id="56" name="Hexagon 55">
+              <a:extLst>
+                <a:ext uri="{FF2B5EF4-FFF2-40B4-BE49-F238E27FC236}">
+                  <a16:creationId xmlns:a16="http://schemas.microsoft.com/office/drawing/2014/main" id="{F4B2FF76-05BE-4DB7-8862-9B6D5328C429}"/>
+                </a:ext>
+              </a:extLst>
+            </p:cNvPr>
+            <p:cNvSpPr/>
+            <p:nvPr/>
+          </p:nvSpPr>
+          <p:spPr>
+            <a:xfrm rot="16200000">
+              <a:off x="2968926" y="4149725"/>
+              <a:ext cx="1371600" cy="1182414"/>
+            </a:xfrm>
+            <a:prstGeom prst="hexagon">
+              <a:avLst/>
+            </a:prstGeom>
+          </p:spPr>
+          <p:style>
+            <a:lnRef idx="2">
+              <a:schemeClr val="accent4">
+                <a:shade val="50000"/>
+              </a:schemeClr>
+            </a:lnRef>
+            <a:fillRef idx="1">
+              <a:schemeClr val="accent4"/>
+            </a:fillRef>
+            <a:effectRef idx="0">
+              <a:schemeClr val="accent4"/>
+            </a:effectRef>
+            <a:fontRef idx="minor">
+              <a:schemeClr val="lt1"/>
+            </a:fontRef>
+          </p:style>
+          <p:txBody>
+            <a:bodyPr rtlCol="0" anchor="ctr"/>
+            <a:lstStyle/>
+            <a:p>
+              <a:pPr algn="ctr"/>
+              <a:endParaRPr lang="en-US" dirty="0"/>
+            </a:p>
+          </p:txBody>
+        </p:sp>
+        <p:sp>
+          <p:nvSpPr>
+            <p:cNvPr id="57" name="Hexagon 56">
+              <a:extLst>
+                <a:ext uri="{FF2B5EF4-FFF2-40B4-BE49-F238E27FC236}">
+                  <a16:creationId xmlns:a16="http://schemas.microsoft.com/office/drawing/2014/main" id="{AFFAA895-77E8-4310-A536-5AC7C393FF04}"/>
+                </a:ext>
+              </a:extLst>
+            </p:cNvPr>
+            <p:cNvSpPr/>
+            <p:nvPr/>
+          </p:nvSpPr>
+          <p:spPr>
+            <a:xfrm rot="16200000">
+              <a:off x="4151341" y="4149723"/>
+              <a:ext cx="1371600" cy="1182414"/>
+            </a:xfrm>
+            <a:prstGeom prst="hexagon">
+              <a:avLst/>
+            </a:prstGeom>
+          </p:spPr>
+          <p:style>
+            <a:lnRef idx="2">
+              <a:schemeClr val="accent4">
+                <a:shade val="50000"/>
+              </a:schemeClr>
+            </a:lnRef>
+            <a:fillRef idx="1">
+              <a:schemeClr val="accent4"/>
+            </a:fillRef>
+            <a:effectRef idx="0">
+              <a:schemeClr val="accent4"/>
+            </a:effectRef>
+            <a:fontRef idx="minor">
+              <a:schemeClr val="lt1"/>
+            </a:fontRef>
+          </p:style>
+          <p:txBody>
+            <a:bodyPr rtlCol="0" anchor="ctr"/>
+            <a:lstStyle/>
+            <a:p>
+              <a:pPr algn="ctr"/>
+              <a:endParaRPr lang="en-US" dirty="0"/>
+            </a:p>
+          </p:txBody>
+        </p:sp>
+        <p:sp>
+          <p:nvSpPr>
+            <p:cNvPr id="58" name="Hexagon 57">
+              <a:extLst>
+                <a:ext uri="{FF2B5EF4-FFF2-40B4-BE49-F238E27FC236}">
+                  <a16:creationId xmlns:a16="http://schemas.microsoft.com/office/drawing/2014/main" id="{DF9884D6-5D6E-40FE-A01F-E5A45F349225}"/>
+                </a:ext>
+              </a:extLst>
+            </p:cNvPr>
+            <p:cNvSpPr/>
+            <p:nvPr/>
+          </p:nvSpPr>
+          <p:spPr>
+            <a:xfrm rot="16200000">
+              <a:off x="5333756" y="4149721"/>
+              <a:ext cx="1371600" cy="1182414"/>
+            </a:xfrm>
+            <a:prstGeom prst="hexagon">
+              <a:avLst/>
+            </a:prstGeom>
+          </p:spPr>
+          <p:style>
+            <a:lnRef idx="2">
+              <a:schemeClr val="accent4">
+                <a:shade val="50000"/>
+              </a:schemeClr>
+            </a:lnRef>
+            <a:fillRef idx="1">
+              <a:schemeClr val="accent4"/>
+            </a:fillRef>
+            <a:effectRef idx="0">
+              <a:schemeClr val="accent4"/>
+            </a:effectRef>
+            <a:fontRef idx="minor">
+              <a:schemeClr val="lt1"/>
+            </a:fontRef>
+          </p:style>
+          <p:txBody>
+            <a:bodyPr rtlCol="0" anchor="ctr"/>
+            <a:lstStyle/>
+            <a:p>
+              <a:pPr algn="ctr"/>
+              <a:endParaRPr lang="en-US" dirty="0"/>
+            </a:p>
+          </p:txBody>
+        </p:sp>
+        <p:sp>
+          <p:nvSpPr>
+            <p:cNvPr id="59" name="Hexagon 58">
+              <a:extLst>
+                <a:ext uri="{FF2B5EF4-FFF2-40B4-BE49-F238E27FC236}">
+                  <a16:creationId xmlns:a16="http://schemas.microsoft.com/office/drawing/2014/main" id="{7072780D-20B9-49E4-BD7B-1773ED2DFE64}"/>
+                </a:ext>
+              </a:extLst>
+            </p:cNvPr>
+            <p:cNvSpPr/>
+            <p:nvPr/>
+          </p:nvSpPr>
+          <p:spPr>
+            <a:xfrm rot="16200000">
+              <a:off x="6516171" y="4149719"/>
+              <a:ext cx="1371600" cy="1182414"/>
+            </a:xfrm>
+            <a:prstGeom prst="hexagon">
+              <a:avLst/>
+            </a:prstGeom>
+          </p:spPr>
+          <p:style>
+            <a:lnRef idx="2">
+              <a:schemeClr val="accent4">
+                <a:shade val="50000"/>
+              </a:schemeClr>
+            </a:lnRef>
+            <a:fillRef idx="1">
+              <a:schemeClr val="accent4"/>
+            </a:fillRef>
+            <a:effectRef idx="0">
+              <a:schemeClr val="accent4"/>
+            </a:effectRef>
+            <a:fontRef idx="minor">
+              <a:schemeClr val="lt1"/>
+            </a:fontRef>
+          </p:style>
+          <p:txBody>
+            <a:bodyPr rtlCol="0" anchor="ctr"/>
+            <a:lstStyle/>
+            <a:p>
+              <a:pPr algn="ctr"/>
+              <a:endParaRPr lang="en-US" dirty="0"/>
+            </a:p>
+          </p:txBody>
+        </p:sp>
+        <p:sp>
+          <p:nvSpPr>
+            <p:cNvPr id="60" name="Hexagon 59">
+              <a:extLst>
+                <a:ext uri="{FF2B5EF4-FFF2-40B4-BE49-F238E27FC236}">
+                  <a16:creationId xmlns:a16="http://schemas.microsoft.com/office/drawing/2014/main" id="{647ACFC0-1800-4D22-868C-367584BA35E1}"/>
+                </a:ext>
+              </a:extLst>
+            </p:cNvPr>
+            <p:cNvSpPr/>
+            <p:nvPr/>
+          </p:nvSpPr>
+          <p:spPr>
+            <a:xfrm rot="16200000">
+              <a:off x="7694838" y="4132037"/>
+              <a:ext cx="1371600" cy="1182414"/>
+            </a:xfrm>
+            <a:prstGeom prst="hexagon">
+              <a:avLst/>
+            </a:prstGeom>
+          </p:spPr>
+          <p:style>
+            <a:lnRef idx="2">
+              <a:schemeClr val="accent4">
+                <a:shade val="50000"/>
+              </a:schemeClr>
+            </a:lnRef>
+            <a:fillRef idx="1">
+              <a:schemeClr val="accent4"/>
+            </a:fillRef>
+            <a:effectRef idx="0">
+              <a:schemeClr val="accent4"/>
+            </a:effectRef>
+            <a:fontRef idx="minor">
+              <a:schemeClr val="lt1"/>
+            </a:fontRef>
+          </p:style>
+          <p:txBody>
+            <a:bodyPr rtlCol="0" anchor="ctr"/>
+            <a:lstStyle/>
+            <a:p>
+              <a:pPr algn="ctr"/>
+              <a:endParaRPr lang="en-US" dirty="0"/>
+            </a:p>
+          </p:txBody>
+        </p:sp>
+        <p:sp>
+          <p:nvSpPr>
+            <p:cNvPr id="61" name="Hexagon 60">
+              <a:extLst>
+                <a:ext uri="{FF2B5EF4-FFF2-40B4-BE49-F238E27FC236}">
+                  <a16:creationId xmlns:a16="http://schemas.microsoft.com/office/drawing/2014/main" id="{FBF0F92A-C566-4BDF-9C56-0000B1B3125E}"/>
+                </a:ext>
+              </a:extLst>
+            </p:cNvPr>
+            <p:cNvSpPr/>
+            <p:nvPr/>
+          </p:nvSpPr>
+          <p:spPr>
+            <a:xfrm rot="16200000">
+              <a:off x="8873505" y="4114355"/>
+              <a:ext cx="1371600" cy="1182414"/>
+            </a:xfrm>
+            <a:prstGeom prst="hexagon">
+              <a:avLst/>
+            </a:prstGeom>
+          </p:spPr>
+          <p:style>
+            <a:lnRef idx="2">
+              <a:schemeClr val="accent4">
+                <a:shade val="50000"/>
+              </a:schemeClr>
+            </a:lnRef>
+            <a:fillRef idx="1">
+              <a:schemeClr val="accent4"/>
+            </a:fillRef>
+            <a:effectRef idx="0">
+              <a:schemeClr val="accent4"/>
+            </a:effectRef>
+            <a:fontRef idx="minor">
+              <a:schemeClr val="lt1"/>
+            </a:fontRef>
+          </p:style>
+          <p:txBody>
+            <a:bodyPr rtlCol="0" anchor="ctr"/>
+            <a:lstStyle/>
+            <a:p>
+              <a:pPr algn="ctr"/>
+              <a:endParaRPr lang="en-US" dirty="0"/>
+            </a:p>
+          </p:txBody>
+        </p:sp>
       </p:grpSp>
+      <p:sp>
+        <p:nvSpPr>
+          <p:cNvPr id="46" name="Hexagon 45">
+            <a:extLst>
+              <a:ext uri="{FF2B5EF4-FFF2-40B4-BE49-F238E27FC236}">
+                <a16:creationId xmlns:a16="http://schemas.microsoft.com/office/drawing/2014/main" id="{A9C7D088-5A46-49F0-921F-00E1F75503FB}"/>
+              </a:ext>
+            </a:extLst>
+          </p:cNvPr>
+          <p:cNvSpPr/>
+          <p:nvPr/>
+        </p:nvSpPr>
+        <p:spPr>
+          <a:xfrm rot="16200000">
+            <a:off x="684286" y="4379790"/>
+            <a:ext cx="1371600" cy="1182414"/>
+          </a:xfrm>
+          <a:prstGeom prst="hexagon">
+            <a:avLst/>
+          </a:prstGeom>
+        </p:spPr>
+        <p:style>
+          <a:lnRef idx="2">
+            <a:schemeClr val="accent4">
+              <a:shade val="50000"/>
+            </a:schemeClr>
+          </a:lnRef>
+          <a:fillRef idx="1">
+            <a:schemeClr val="accent4"/>
+          </a:fillRef>
+          <a:effectRef idx="0">
+            <a:schemeClr val="accent4"/>
+          </a:effectRef>
+          <a:fontRef idx="minor">
+            <a:schemeClr val="lt1"/>
+          </a:fontRef>
+        </p:style>
+        <p:txBody>
+          <a:bodyPr rtlCol="0" anchor="ctr"/>
+          <a:lstStyle/>
+          <a:p>
+            <a:pPr algn="ctr"/>
+            <a:endParaRPr lang="en-US" dirty="0"/>
+          </a:p>
+        </p:txBody>
+      </p:sp>
+      <p:sp>
+        <p:nvSpPr>
+          <p:cNvPr id="47" name="Hexagon 46">
+            <a:extLst>
+              <a:ext uri="{FF2B5EF4-FFF2-40B4-BE49-F238E27FC236}">
+                <a16:creationId xmlns:a16="http://schemas.microsoft.com/office/drawing/2014/main" id="{183B271D-DBE1-488C-B695-17EF140AD9A0}"/>
+              </a:ext>
+            </a:extLst>
+          </p:cNvPr>
+          <p:cNvSpPr/>
+          <p:nvPr/>
+        </p:nvSpPr>
+        <p:spPr>
+          <a:xfrm rot="16200000">
+            <a:off x="1866701" y="4379790"/>
+            <a:ext cx="1371600" cy="1182414"/>
+          </a:xfrm>
+          <a:prstGeom prst="hexagon">
+            <a:avLst/>
+          </a:prstGeom>
+        </p:spPr>
+        <p:style>
+          <a:lnRef idx="2">
+            <a:schemeClr val="accent4">
+              <a:shade val="50000"/>
+            </a:schemeClr>
+          </a:lnRef>
+          <a:fillRef idx="1">
+            <a:schemeClr val="accent4"/>
+          </a:fillRef>
+          <a:effectRef idx="0">
+            <a:schemeClr val="accent4"/>
+          </a:effectRef>
+          <a:fontRef idx="minor">
+            <a:schemeClr val="lt1"/>
+          </a:fontRef>
+        </p:style>
+        <p:txBody>
+          <a:bodyPr rtlCol="0" anchor="ctr"/>
+          <a:lstStyle/>
+          <a:p>
+            <a:pPr algn="ctr"/>
+            <a:endParaRPr lang="en-US" dirty="0"/>
+          </a:p>
+        </p:txBody>
+      </p:sp>
+      <p:sp>
+        <p:nvSpPr>
+          <p:cNvPr id="48" name="Hexagon 47">
+            <a:extLst>
+              <a:ext uri="{FF2B5EF4-FFF2-40B4-BE49-F238E27FC236}">
+                <a16:creationId xmlns:a16="http://schemas.microsoft.com/office/drawing/2014/main" id="{BEAE9A87-61E5-4647-86F7-28F89ABED956}"/>
+              </a:ext>
+            </a:extLst>
+          </p:cNvPr>
+          <p:cNvSpPr/>
+          <p:nvPr/>
+        </p:nvSpPr>
+        <p:spPr>
+          <a:xfrm rot="16200000">
+            <a:off x="3049116" y="4379790"/>
+            <a:ext cx="1371600" cy="1182414"/>
+          </a:xfrm>
+          <a:prstGeom prst="hexagon">
+            <a:avLst/>
+          </a:prstGeom>
+        </p:spPr>
+        <p:style>
+          <a:lnRef idx="2">
+            <a:schemeClr val="accent4">
+              <a:shade val="50000"/>
+            </a:schemeClr>
+          </a:lnRef>
+          <a:fillRef idx="1">
+            <a:schemeClr val="accent4"/>
+          </a:fillRef>
+          <a:effectRef idx="0">
+            <a:schemeClr val="accent4"/>
+          </a:effectRef>
+          <a:fontRef idx="minor">
+            <a:schemeClr val="lt1"/>
+          </a:fontRef>
+        </p:style>
+        <p:txBody>
+          <a:bodyPr rtlCol="0" anchor="ctr"/>
+          <a:lstStyle/>
+          <a:p>
+            <a:pPr algn="ctr"/>
+            <a:endParaRPr lang="en-US" dirty="0"/>
+          </a:p>
+        </p:txBody>
+      </p:sp>
+      <p:sp>
+        <p:nvSpPr>
+          <p:cNvPr id="49" name="Hexagon 48">
+            <a:extLst>
+              <a:ext uri="{FF2B5EF4-FFF2-40B4-BE49-F238E27FC236}">
+                <a16:creationId xmlns:a16="http://schemas.microsoft.com/office/drawing/2014/main" id="{C05218DE-6C27-441E-A053-6B6554D5508B}"/>
+              </a:ext>
+            </a:extLst>
+          </p:cNvPr>
+          <p:cNvSpPr/>
+          <p:nvPr/>
+        </p:nvSpPr>
+        <p:spPr>
+          <a:xfrm rot="16200000">
+            <a:off x="4231531" y="4379790"/>
+            <a:ext cx="1371600" cy="1182414"/>
+          </a:xfrm>
+          <a:prstGeom prst="hexagon">
+            <a:avLst/>
+          </a:prstGeom>
+        </p:spPr>
+        <p:style>
+          <a:lnRef idx="2">
+            <a:schemeClr val="accent4">
+              <a:shade val="50000"/>
+            </a:schemeClr>
+          </a:lnRef>
+          <a:fillRef idx="1">
+            <a:schemeClr val="accent4"/>
+          </a:fillRef>
+          <a:effectRef idx="0">
+            <a:schemeClr val="accent4"/>
+          </a:effectRef>
+          <a:fontRef idx="minor">
+            <a:schemeClr val="lt1"/>
+          </a:fontRef>
+        </p:style>
+        <p:txBody>
+          <a:bodyPr rtlCol="0" anchor="ctr"/>
+          <a:lstStyle/>
+          <a:p>
+            <a:pPr algn="ctr"/>
+            <a:endParaRPr lang="en-US" dirty="0"/>
+          </a:p>
+        </p:txBody>
+      </p:sp>
+      <p:sp>
+        <p:nvSpPr>
+          <p:cNvPr id="50" name="Hexagon 49">
+            <a:extLst>
+              <a:ext uri="{FF2B5EF4-FFF2-40B4-BE49-F238E27FC236}">
+                <a16:creationId xmlns:a16="http://schemas.microsoft.com/office/drawing/2014/main" id="{84FD9BDF-123D-4FFE-BD6F-4AE42DFAA468}"/>
+              </a:ext>
+            </a:extLst>
+          </p:cNvPr>
+          <p:cNvSpPr/>
+          <p:nvPr/>
+        </p:nvSpPr>
+        <p:spPr>
+          <a:xfrm rot="16200000">
+            <a:off x="5413946" y="4379790"/>
+            <a:ext cx="1371600" cy="1182414"/>
+          </a:xfrm>
+          <a:prstGeom prst="hexagon">
+            <a:avLst/>
+          </a:prstGeom>
+        </p:spPr>
+        <p:style>
+          <a:lnRef idx="2">
+            <a:schemeClr val="accent4">
+              <a:shade val="50000"/>
+            </a:schemeClr>
+          </a:lnRef>
+          <a:fillRef idx="1">
+            <a:schemeClr val="accent4"/>
+          </a:fillRef>
+          <a:effectRef idx="0">
+            <a:schemeClr val="accent4"/>
+          </a:effectRef>
+          <a:fontRef idx="minor">
+            <a:schemeClr val="lt1"/>
+          </a:fontRef>
+        </p:style>
+        <p:txBody>
+          <a:bodyPr rtlCol="0" anchor="ctr"/>
+          <a:lstStyle/>
+          <a:p>
+            <a:pPr algn="ctr"/>
+            <a:endParaRPr lang="en-US" dirty="0"/>
+          </a:p>
+        </p:txBody>
+      </p:sp>
+      <p:sp>
+        <p:nvSpPr>
+          <p:cNvPr id="51" name="Hexagon 50">
+            <a:extLst>
+              <a:ext uri="{FF2B5EF4-FFF2-40B4-BE49-F238E27FC236}">
+                <a16:creationId xmlns:a16="http://schemas.microsoft.com/office/drawing/2014/main" id="{E97C59B0-F1D5-41E5-8952-297F9A7B6697}"/>
+              </a:ext>
+            </a:extLst>
+          </p:cNvPr>
+          <p:cNvSpPr/>
+          <p:nvPr/>
+        </p:nvSpPr>
+        <p:spPr>
+          <a:xfrm rot="16200000">
+            <a:off x="6594487" y="4362108"/>
+            <a:ext cx="1371600" cy="1182414"/>
+          </a:xfrm>
+          <a:prstGeom prst="hexagon">
+            <a:avLst/>
+          </a:prstGeom>
+        </p:spPr>
+        <p:style>
+          <a:lnRef idx="2">
+            <a:schemeClr val="accent4">
+              <a:shade val="50000"/>
+            </a:schemeClr>
+          </a:lnRef>
+          <a:fillRef idx="1">
+            <a:schemeClr val="accent4"/>
+          </a:fillRef>
+          <a:effectRef idx="0">
+            <a:schemeClr val="accent4"/>
+          </a:effectRef>
+          <a:fontRef idx="minor">
+            <a:schemeClr val="lt1"/>
+          </a:fontRef>
+        </p:style>
+        <p:txBody>
+          <a:bodyPr rtlCol="0" anchor="ctr"/>
+          <a:lstStyle/>
+          <a:p>
+            <a:pPr algn="ctr"/>
+            <a:endParaRPr lang="en-US" dirty="0"/>
+          </a:p>
+        </p:txBody>
+      </p:sp>
+      <p:sp>
+        <p:nvSpPr>
+          <p:cNvPr id="52" name="Hexagon 51">
+            <a:extLst>
+              <a:ext uri="{FF2B5EF4-FFF2-40B4-BE49-F238E27FC236}">
+                <a16:creationId xmlns:a16="http://schemas.microsoft.com/office/drawing/2014/main" id="{11334973-D441-45AC-84CD-3230FDD13425}"/>
+              </a:ext>
+            </a:extLst>
+          </p:cNvPr>
+          <p:cNvSpPr/>
+          <p:nvPr/>
+        </p:nvSpPr>
+        <p:spPr>
+          <a:xfrm rot="16200000">
+            <a:off x="7775028" y="4344426"/>
+            <a:ext cx="1371600" cy="1182414"/>
+          </a:xfrm>
+          <a:prstGeom prst="hexagon">
+            <a:avLst/>
+          </a:prstGeom>
+        </p:spPr>
+        <p:style>
+          <a:lnRef idx="2">
+            <a:schemeClr val="accent4">
+              <a:shade val="50000"/>
+            </a:schemeClr>
+          </a:lnRef>
+          <a:fillRef idx="1">
+            <a:schemeClr val="accent4"/>
+          </a:fillRef>
+          <a:effectRef idx="0">
+            <a:schemeClr val="accent4"/>
+          </a:effectRef>
+          <a:fontRef idx="minor">
+            <a:schemeClr val="lt1"/>
+          </a:fontRef>
+        </p:style>
+        <p:txBody>
+          <a:bodyPr rtlCol="0" anchor="ctr"/>
+          <a:lstStyle/>
+          <a:p>
+            <a:pPr algn="ctr"/>
+            <a:endParaRPr lang="en-US" dirty="0"/>
+          </a:p>
+        </p:txBody>
+      </p:sp>
+      <p:sp>
+        <p:nvSpPr>
+          <p:cNvPr id="53" name="Hexagon 52">
+            <a:extLst>
+              <a:ext uri="{FF2B5EF4-FFF2-40B4-BE49-F238E27FC236}">
+                <a16:creationId xmlns:a16="http://schemas.microsoft.com/office/drawing/2014/main" id="{244D4F97-1152-4593-8554-F24FD4055D58}"/>
+              </a:ext>
+            </a:extLst>
+          </p:cNvPr>
+          <p:cNvSpPr/>
+          <p:nvPr/>
+        </p:nvSpPr>
+        <p:spPr>
+          <a:xfrm rot="16200000">
+            <a:off x="8955569" y="4326744"/>
+            <a:ext cx="1371600" cy="1182414"/>
+          </a:xfrm>
+          <a:prstGeom prst="hexagon">
+            <a:avLst/>
+          </a:prstGeom>
+        </p:spPr>
+        <p:style>
+          <a:lnRef idx="2">
+            <a:schemeClr val="accent4">
+              <a:shade val="50000"/>
+            </a:schemeClr>
+          </a:lnRef>
+          <a:fillRef idx="1">
+            <a:schemeClr val="accent4"/>
+          </a:fillRef>
+          <a:effectRef idx="0">
+            <a:schemeClr val="accent4"/>
+          </a:effectRef>
+          <a:fontRef idx="minor">
+            <a:schemeClr val="lt1"/>
+          </a:fontRef>
+        </p:style>
+        <p:txBody>
+          <a:bodyPr rtlCol="0" anchor="ctr"/>
+          <a:lstStyle/>
+          <a:p>
+            <a:pPr algn="ctr"/>
+            <a:endParaRPr lang="en-US" dirty="0"/>
+          </a:p>
+        </p:txBody>
+      </p:sp>
+      <p:sp>
+        <p:nvSpPr>
+          <p:cNvPr id="54" name="Hexagon 53">
+            <a:extLst>
+              <a:ext uri="{FF2B5EF4-FFF2-40B4-BE49-F238E27FC236}">
+                <a16:creationId xmlns:a16="http://schemas.microsoft.com/office/drawing/2014/main" id="{4C59502E-4CD6-459A-A379-F38033D24019}"/>
+              </a:ext>
+            </a:extLst>
+          </p:cNvPr>
+          <p:cNvSpPr/>
+          <p:nvPr/>
+        </p:nvSpPr>
+        <p:spPr>
+          <a:xfrm rot="16200000">
+            <a:off x="10136110" y="4309062"/>
+            <a:ext cx="1371600" cy="1182414"/>
+          </a:xfrm>
+          <a:prstGeom prst="hexagon">
+            <a:avLst/>
+          </a:prstGeom>
+        </p:spPr>
+        <p:style>
+          <a:lnRef idx="2">
+            <a:schemeClr val="accent4">
+              <a:shade val="50000"/>
+            </a:schemeClr>
+          </a:lnRef>
+          <a:fillRef idx="1">
+            <a:schemeClr val="accent4"/>
+          </a:fillRef>
+          <a:effectRef idx="0">
+            <a:schemeClr val="accent4"/>
+          </a:effectRef>
+          <a:fontRef idx="minor">
+            <a:schemeClr val="lt1"/>
+          </a:fontRef>
+        </p:style>
+        <p:txBody>
+          <a:bodyPr rtlCol="0" anchor="ctr"/>
+          <a:lstStyle/>
+          <a:p>
+            <a:pPr algn="ctr"/>
+            <a:endParaRPr lang="en-US" dirty="0"/>
+          </a:p>
+        </p:txBody>
+      </p:sp>
+      <p:sp>
+        <p:nvSpPr>
+          <p:cNvPr id="72" name="Hexagon 71">
+            <a:extLst>
+              <a:ext uri="{FF2B5EF4-FFF2-40B4-BE49-F238E27FC236}">
+                <a16:creationId xmlns:a16="http://schemas.microsoft.com/office/drawing/2014/main" id="{AC421652-E329-44A8-AC77-8C53FF460E44}"/>
+              </a:ext>
+            </a:extLst>
+          </p:cNvPr>
+          <p:cNvSpPr/>
+          <p:nvPr/>
+        </p:nvSpPr>
+        <p:spPr>
+          <a:xfrm rot="16200000">
+            <a:off x="9542092" y="5380370"/>
+            <a:ext cx="1371600" cy="1182414"/>
+          </a:xfrm>
+          <a:prstGeom prst="hexagon">
+            <a:avLst/>
+          </a:prstGeom>
+        </p:spPr>
+        <p:style>
+          <a:lnRef idx="2">
+            <a:schemeClr val="accent4">
+              <a:shade val="50000"/>
+            </a:schemeClr>
+          </a:lnRef>
+          <a:fillRef idx="1">
+            <a:schemeClr val="accent4"/>
+          </a:fillRef>
+          <a:effectRef idx="0">
+            <a:schemeClr val="accent4"/>
+          </a:effectRef>
+          <a:fontRef idx="minor">
+            <a:schemeClr val="lt1"/>
+          </a:fontRef>
+        </p:style>
+        <p:txBody>
+          <a:bodyPr rtlCol="0" anchor="ctr"/>
+          <a:lstStyle/>
+          <a:p>
+            <a:pPr algn="ctr"/>
+            <a:endParaRPr lang="en-US" dirty="0"/>
+          </a:p>
+        </p:txBody>
+      </p:sp>
+      <p:sp>
+        <p:nvSpPr>
+          <p:cNvPr id="73" name="Hexagon 72">
+            <a:extLst>
+              <a:ext uri="{FF2B5EF4-FFF2-40B4-BE49-F238E27FC236}">
+                <a16:creationId xmlns:a16="http://schemas.microsoft.com/office/drawing/2014/main" id="{1E616544-9EB7-4225-A613-9725D89A5A00}"/>
+              </a:ext>
+            </a:extLst>
+          </p:cNvPr>
+          <p:cNvSpPr/>
+          <p:nvPr/>
+        </p:nvSpPr>
+        <p:spPr>
+          <a:xfrm rot="16200000">
+            <a:off x="1281113" y="5433422"/>
+            <a:ext cx="1371600" cy="1182414"/>
+          </a:xfrm>
+          <a:prstGeom prst="hexagon">
+            <a:avLst/>
+          </a:prstGeom>
+        </p:spPr>
+        <p:style>
+          <a:lnRef idx="2">
+            <a:schemeClr val="accent4">
+              <a:shade val="50000"/>
+            </a:schemeClr>
+          </a:lnRef>
+          <a:fillRef idx="1">
+            <a:schemeClr val="accent4"/>
+          </a:fillRef>
+          <a:effectRef idx="0">
+            <a:schemeClr val="accent4"/>
+          </a:effectRef>
+          <a:fontRef idx="minor">
+            <a:schemeClr val="lt1"/>
+          </a:fontRef>
+        </p:style>
+        <p:txBody>
+          <a:bodyPr rtlCol="0" anchor="ctr"/>
+          <a:lstStyle/>
+          <a:p>
+            <a:pPr algn="ctr"/>
+            <a:endParaRPr lang="en-US" dirty="0"/>
+          </a:p>
+        </p:txBody>
+      </p:sp>
+      <p:sp>
+        <p:nvSpPr>
+          <p:cNvPr id="74" name="Hexagon 73">
+            <a:extLst>
+              <a:ext uri="{FF2B5EF4-FFF2-40B4-BE49-F238E27FC236}">
+                <a16:creationId xmlns:a16="http://schemas.microsoft.com/office/drawing/2014/main" id="{B5E81FDC-4103-4E52-9A95-6785A5418357}"/>
+              </a:ext>
+            </a:extLst>
+          </p:cNvPr>
+          <p:cNvSpPr/>
+          <p:nvPr/>
+        </p:nvSpPr>
+        <p:spPr>
+          <a:xfrm rot="16200000">
+            <a:off x="2463528" y="5433422"/>
+            <a:ext cx="1371600" cy="1182414"/>
+          </a:xfrm>
+          <a:prstGeom prst="hexagon">
+            <a:avLst/>
+          </a:prstGeom>
+        </p:spPr>
+        <p:style>
+          <a:lnRef idx="2">
+            <a:schemeClr val="accent4">
+              <a:shade val="50000"/>
+            </a:schemeClr>
+          </a:lnRef>
+          <a:fillRef idx="1">
+            <a:schemeClr val="accent4"/>
+          </a:fillRef>
+          <a:effectRef idx="0">
+            <a:schemeClr val="accent4"/>
+          </a:effectRef>
+          <a:fontRef idx="minor">
+            <a:schemeClr val="lt1"/>
+          </a:fontRef>
+        </p:style>
+        <p:txBody>
+          <a:bodyPr rtlCol="0" anchor="ctr"/>
+          <a:lstStyle/>
+          <a:p>
+            <a:pPr algn="ctr"/>
+            <a:endParaRPr lang="en-US" dirty="0"/>
+          </a:p>
+        </p:txBody>
+      </p:sp>
+      <p:sp>
+        <p:nvSpPr>
+          <p:cNvPr id="75" name="Hexagon 74">
+            <a:extLst>
+              <a:ext uri="{FF2B5EF4-FFF2-40B4-BE49-F238E27FC236}">
+                <a16:creationId xmlns:a16="http://schemas.microsoft.com/office/drawing/2014/main" id="{D3A7BE9F-3C4D-4E34-9C9F-C405C9C7E616}"/>
+              </a:ext>
+            </a:extLst>
+          </p:cNvPr>
+          <p:cNvSpPr/>
+          <p:nvPr/>
+        </p:nvSpPr>
+        <p:spPr>
+          <a:xfrm rot="16200000">
+            <a:off x="3628147" y="5433416"/>
+            <a:ext cx="1371600" cy="1182414"/>
+          </a:xfrm>
+          <a:prstGeom prst="hexagon">
+            <a:avLst/>
+          </a:prstGeom>
+        </p:spPr>
+        <p:style>
+          <a:lnRef idx="2">
+            <a:schemeClr val="accent2">
+              <a:shade val="50000"/>
+            </a:schemeClr>
+          </a:lnRef>
+          <a:fillRef idx="1">
+            <a:schemeClr val="accent2"/>
+          </a:fillRef>
+          <a:effectRef idx="0">
+            <a:schemeClr val="accent2"/>
+          </a:effectRef>
+          <a:fontRef idx="minor">
+            <a:schemeClr val="lt1"/>
+          </a:fontRef>
+        </p:style>
+        <p:txBody>
+          <a:bodyPr rtlCol="0" anchor="ctr"/>
+          <a:lstStyle/>
+          <a:p>
+            <a:pPr algn="ctr"/>
+            <a:endParaRPr lang="en-US" dirty="0"/>
+          </a:p>
+        </p:txBody>
+      </p:sp>
+      <p:sp>
+        <p:nvSpPr>
+          <p:cNvPr id="76" name="Hexagon 75">
+            <a:extLst>
+              <a:ext uri="{FF2B5EF4-FFF2-40B4-BE49-F238E27FC236}">
+                <a16:creationId xmlns:a16="http://schemas.microsoft.com/office/drawing/2014/main" id="{7582FA29-3E00-49FA-8E64-697C41EA69CE}"/>
+              </a:ext>
+            </a:extLst>
+          </p:cNvPr>
+          <p:cNvSpPr/>
+          <p:nvPr/>
+        </p:nvSpPr>
+        <p:spPr>
+          <a:xfrm rot="16200000">
+            <a:off x="4828358" y="5433418"/>
+            <a:ext cx="1371600" cy="1182414"/>
+          </a:xfrm>
+          <a:prstGeom prst="hexagon">
+            <a:avLst/>
+          </a:prstGeom>
+        </p:spPr>
+        <p:style>
+          <a:lnRef idx="2">
+            <a:schemeClr val="accent4">
+              <a:shade val="50000"/>
+            </a:schemeClr>
+          </a:lnRef>
+          <a:fillRef idx="1">
+            <a:schemeClr val="accent4"/>
+          </a:fillRef>
+          <a:effectRef idx="0">
+            <a:schemeClr val="accent4"/>
+          </a:effectRef>
+          <a:fontRef idx="minor">
+            <a:schemeClr val="lt1"/>
+          </a:fontRef>
+        </p:style>
+        <p:txBody>
+          <a:bodyPr rtlCol="0" anchor="ctr"/>
+          <a:lstStyle/>
+          <a:p>
+            <a:pPr algn="ctr"/>
+            <a:endParaRPr lang="en-US" dirty="0"/>
+          </a:p>
+        </p:txBody>
+      </p:sp>
+      <p:sp>
+        <p:nvSpPr>
+          <p:cNvPr id="77" name="Hexagon 76">
+            <a:extLst>
+              <a:ext uri="{FF2B5EF4-FFF2-40B4-BE49-F238E27FC236}">
+                <a16:creationId xmlns:a16="http://schemas.microsoft.com/office/drawing/2014/main" id="{6445EA8C-DABB-4803-A803-CF2844F69E1E}"/>
+              </a:ext>
+            </a:extLst>
+          </p:cNvPr>
+          <p:cNvSpPr/>
+          <p:nvPr/>
+        </p:nvSpPr>
+        <p:spPr>
+          <a:xfrm rot="16200000">
+            <a:off x="6010773" y="5433416"/>
+            <a:ext cx="1371600" cy="1182414"/>
+          </a:xfrm>
+          <a:prstGeom prst="hexagon">
+            <a:avLst/>
+          </a:prstGeom>
+        </p:spPr>
+        <p:style>
+          <a:lnRef idx="2">
+            <a:schemeClr val="accent4">
+              <a:shade val="50000"/>
+            </a:schemeClr>
+          </a:lnRef>
+          <a:fillRef idx="1">
+            <a:schemeClr val="accent4"/>
+          </a:fillRef>
+          <a:effectRef idx="0">
+            <a:schemeClr val="accent4"/>
+          </a:effectRef>
+          <a:fontRef idx="minor">
+            <a:schemeClr val="lt1"/>
+          </a:fontRef>
+        </p:style>
+        <p:txBody>
+          <a:bodyPr rtlCol="0" anchor="ctr"/>
+          <a:lstStyle/>
+          <a:p>
+            <a:pPr algn="ctr"/>
+            <a:endParaRPr lang="en-US" dirty="0"/>
+          </a:p>
+        </p:txBody>
+      </p:sp>
+      <p:sp>
+        <p:nvSpPr>
+          <p:cNvPr id="78" name="Hexagon 77">
+            <a:extLst>
+              <a:ext uri="{FF2B5EF4-FFF2-40B4-BE49-F238E27FC236}">
+                <a16:creationId xmlns:a16="http://schemas.microsoft.com/office/drawing/2014/main" id="{47289A1B-FC29-40B2-A64A-E4C378ACC4EA}"/>
+              </a:ext>
+            </a:extLst>
+          </p:cNvPr>
+          <p:cNvSpPr/>
+          <p:nvPr/>
+        </p:nvSpPr>
+        <p:spPr>
+          <a:xfrm rot="16200000">
+            <a:off x="7189440" y="5415734"/>
+            <a:ext cx="1371600" cy="1182414"/>
+          </a:xfrm>
+          <a:prstGeom prst="hexagon">
+            <a:avLst/>
+          </a:prstGeom>
+        </p:spPr>
+        <p:style>
+          <a:lnRef idx="2">
+            <a:schemeClr val="accent2">
+              <a:shade val="50000"/>
+            </a:schemeClr>
+          </a:lnRef>
+          <a:fillRef idx="1">
+            <a:schemeClr val="accent2"/>
+          </a:fillRef>
+          <a:effectRef idx="0">
+            <a:schemeClr val="accent2"/>
+          </a:effectRef>
+          <a:fontRef idx="minor">
+            <a:schemeClr val="lt1"/>
+          </a:fontRef>
+        </p:style>
+        <p:txBody>
+          <a:bodyPr rtlCol="0" anchor="ctr"/>
+          <a:lstStyle/>
+          <a:p>
+            <a:pPr algn="ctr"/>
+            <a:endParaRPr lang="en-US" dirty="0"/>
+          </a:p>
+        </p:txBody>
+      </p:sp>
+      <p:sp>
+        <p:nvSpPr>
+          <p:cNvPr id="79" name="Hexagon 78">
+            <a:extLst>
+              <a:ext uri="{FF2B5EF4-FFF2-40B4-BE49-F238E27FC236}">
+                <a16:creationId xmlns:a16="http://schemas.microsoft.com/office/drawing/2014/main" id="{25257124-4AEE-4F9E-B5CC-4B3F35C524EE}"/>
+              </a:ext>
+            </a:extLst>
+          </p:cNvPr>
+          <p:cNvSpPr/>
+          <p:nvPr/>
+        </p:nvSpPr>
+        <p:spPr>
+          <a:xfrm rot="16200000">
+            <a:off x="8368107" y="5398052"/>
+            <a:ext cx="1371600" cy="1182414"/>
+          </a:xfrm>
+          <a:prstGeom prst="hexagon">
+            <a:avLst/>
+          </a:prstGeom>
+        </p:spPr>
+        <p:style>
+          <a:lnRef idx="2">
+            <a:schemeClr val="accent4">
+              <a:shade val="50000"/>
+            </a:schemeClr>
+          </a:lnRef>
+          <a:fillRef idx="1">
+            <a:schemeClr val="accent4"/>
+          </a:fillRef>
+          <a:effectRef idx="0">
+            <a:schemeClr val="accent4"/>
+          </a:effectRef>
+          <a:fontRef idx="minor">
+            <a:schemeClr val="lt1"/>
+          </a:fontRef>
+        </p:style>
+        <p:txBody>
+          <a:bodyPr rtlCol="0" anchor="ctr"/>
+          <a:lstStyle/>
+          <a:p>
+            <a:pPr algn="ctr"/>
+            <a:endParaRPr lang="en-US" dirty="0"/>
+          </a:p>
+        </p:txBody>
+      </p:sp>
     </p:spTree>
     <p:extLst>
       <p:ext uri="{BB962C8B-B14F-4D97-AF65-F5344CB8AC3E}">

</xml_diff>